<commit_message>
Minor updates to W4 activity and slides
</commit_message>
<xml_diff>
--- a/Documents/Week 4/EnterpriseJava4.pptx
+++ b/Documents/Week 4/EnterpriseJava4.pptx
@@ -5,10 +5,10 @@
     <p:sldMasterId id="2147483648" r:id="rId1"/>
   </p:sldMasterIdLst>
   <p:notesMasterIdLst>
-    <p:notesMasterId r:id="rId15"/>
+    <p:notesMasterId r:id="rId13"/>
   </p:notesMasterIdLst>
   <p:handoutMasterIdLst>
-    <p:handoutMasterId r:id="rId16"/>
+    <p:handoutMasterId r:id="rId14"/>
   </p:handoutMasterIdLst>
   <p:sldIdLst>
     <p:sldId id="256" r:id="rId2"/>
@@ -22,8 +22,6 @@
     <p:sldId id="329" r:id="rId10"/>
     <p:sldId id="328" r:id="rId11"/>
     <p:sldId id="335" r:id="rId12"/>
-    <p:sldId id="337" r:id="rId13"/>
-    <p:sldId id="338" r:id="rId14"/>
   </p:sldIdLst>
   <p:sldSz cx="9144000" cy="6858000" type="screen4x3"/>
   <p:notesSz cx="6858000" cy="9144000"/>
@@ -206,7 +204,7 @@
             <a:fld id="{E613903A-B8B5-4602-B0B5-8C472DB8A55D}" type="datetimeFigureOut">
               <a:rPr lang="en-US" smtClean="0"/>
               <a:pPr/>
-              <a:t>8/16/2012</a:t>
+              <a:t>3/19/2014</a:t>
             </a:fld>
             <a:endParaRPr lang="en-NZ"/>
           </a:p>
@@ -370,7 +368,7 @@
             <a:fld id="{A8ADFD5B-A66C-449C-B6E8-FB716D07777D}" type="datetimeFigureOut">
               <a:rPr lang="en-US" smtClean="0"/>
               <a:pPr/>
-              <a:t>8/16/2012</a:t>
+              <a:t>3/19/2014</a:t>
             </a:fld>
             <a:endParaRPr lang="en-US"/>
           </a:p>
@@ -1086,7 +1084,7 @@
                 </a:solidFill>
               </a:rPr>
               <a:pPr algn="ctr"/>
-              <a:t>8/16/2012</a:t>
+              <a:t>3/19/2014</a:t>
             </a:fld>
             <a:endParaRPr lang="en-US" sz="2000" dirty="0">
               <a:solidFill>
@@ -1555,7 +1553,7 @@
             <a:fld id="{1AD18AD3-3CE8-43DF-9519-0CE09E5A5B13}" type="datetime1">
               <a:rPr lang="en-US" smtClean="0"/>
               <a:pPr/>
-              <a:t>8/16/2012</a:t>
+              <a:t>3/19/2014</a:t>
             </a:fld>
             <a:endParaRPr lang="en-US"/>
           </a:p>
@@ -2055,7 +2053,7 @@
             <a:fld id="{A4F74A13-0F99-4BDF-830A-2C64F08FBEA2}" type="datetime1">
               <a:rPr lang="en-US" smtClean="0"/>
               <a:pPr/>
-              <a:t>8/16/2012</a:t>
+              <a:t>3/19/2014</a:t>
             </a:fld>
             <a:endParaRPr lang="en-US"/>
           </a:p>
@@ -2319,7 +2317,7 @@
             <a:fld id="{AAD27745-9C0E-4338-8AE1-C73B2B0AE541}" type="datetime1">
               <a:rPr lang="en-US" smtClean="0"/>
               <a:pPr/>
-              <a:t>8/16/2012</a:t>
+              <a:t>3/19/2014</a:t>
             </a:fld>
             <a:endParaRPr lang="en-US"/>
           </a:p>
@@ -2575,7 +2573,7 @@
             <a:fld id="{AB7A63FC-A3AF-487E-B6EE-07AF4A4C83CD}" type="datetime1">
               <a:rPr lang="en-US" smtClean="0"/>
               <a:pPr/>
-              <a:t>8/16/2012</a:t>
+              <a:t>3/19/2014</a:t>
             </a:fld>
             <a:endParaRPr lang="en-US"/>
           </a:p>
@@ -2789,7 +2787,7 @@
             <a:fld id="{072F2C37-0788-4C48-A1F0-02CF2F89760A}" type="datetime1">
               <a:rPr lang="en-US" smtClean="0"/>
               <a:pPr/>
-              <a:t>8/16/2012</a:t>
+              <a:t>3/19/2014</a:t>
             </a:fld>
             <a:endParaRPr lang="en-US"/>
           </a:p>
@@ -2894,7 +2892,7 @@
             <a:fld id="{1971D7C2-ECDD-4253-A46B-5D73BD5CD815}" type="datetime1">
               <a:rPr lang="en-US" smtClean="0"/>
               <a:pPr/>
-              <a:t>8/16/2012</a:t>
+              <a:t>3/19/2014</a:t>
             </a:fld>
             <a:endParaRPr lang="en-US"/>
           </a:p>
@@ -3046,7 +3044,7 @@
             <a:fld id="{CE9E1F25-5926-42E7-9751-02D2D00C352F}" type="datetime1">
               <a:rPr lang="en-US" smtClean="0"/>
               <a:pPr/>
-              <a:t>8/16/2012</a:t>
+              <a:t>3/19/2014</a:t>
             </a:fld>
             <a:endParaRPr lang="en-US"/>
           </a:p>
@@ -3634,7 +3632,7 @@
             <a:fld id="{E3965B5F-D443-40C1-9BB4-E8FD76C1056C}" type="datetime1">
               <a:rPr lang="en-US" smtClean="0"/>
               <a:pPr/>
-              <a:t>8/16/2012</a:t>
+              <a:t>3/19/2014</a:t>
             </a:fld>
             <a:endParaRPr lang="en-US"/>
           </a:p>
@@ -3834,7 +3832,7 @@
             <a:fld id="{A9F4B5FD-BA4E-4BA2-81DF-2BA71E9EE121}" type="datetime1">
               <a:rPr lang="en-US" smtClean="0"/>
               <a:pPr/>
-              <a:t>8/16/2012</a:t>
+              <a:t>3/19/2014</a:t>
             </a:fld>
             <a:endParaRPr lang="en-US" sz="1400" dirty="0">
               <a:solidFill>
@@ -4488,11 +4486,7 @@
           <a:p>
             <a:r>
               <a:rPr lang="en-US" dirty="0" smtClean="0"/>
-              <a:t>Lecture </a:t>
-            </a:r>
-            <a:r>
-              <a:rPr lang="en-US" dirty="0" smtClean="0"/>
-              <a:t>4 – Hibernate Associations</a:t>
+              <a:t>Lecture 4 – Hibernate Associations</a:t>
             </a:r>
             <a:endParaRPr lang="en-US" dirty="0"/>
           </a:p>
@@ -4942,16 +4936,7 @@
                 </a:solidFill>
                 <a:latin typeface="Consolas"/>
               </a:rPr>
-              <a:t>, no session or session was </a:t>
-            </a:r>
-            <a:r>
-              <a:rPr lang="en-NZ" sz="1800" u="sng" dirty="0" smtClean="0">
-                <a:solidFill>
-                  <a:srgbClr val="FF0000"/>
-                </a:solidFill>
-                <a:latin typeface="Consolas"/>
-              </a:rPr>
-              <a:t>closed</a:t>
+              <a:t>, no session or session was closed</a:t>
             </a:r>
           </a:p>
           <a:p>
@@ -4960,469 +4945,6 @@
           </a:p>
         </p:txBody>
       </p:sp>
-    </p:spTree>
-  </p:cSld>
-  <p:clrMapOvr>
-    <a:masterClrMapping/>
-  </p:clrMapOvr>
-  <p:timing>
-    <p:tnLst>
-      <p:par>
-        <p:cTn id="1" dur="indefinite" restart="never" nodeType="tmRoot"/>
-      </p:par>
-    </p:tnLst>
-  </p:timing>
-</p:sld>
-</file>
-
-<file path=ppt/slides/slide12.xml><?xml version="1.0" encoding="utf-8"?>
-<p:sld xmlns:a="http://schemas.openxmlformats.org/drawingml/2006/main" xmlns:r="http://schemas.openxmlformats.org/officeDocument/2006/relationships" xmlns:p="http://schemas.openxmlformats.org/presentationml/2006/main">
-  <p:cSld>
-    <p:spTree>
-      <p:nvGrpSpPr>
-        <p:cNvPr id="1" name=""/>
-        <p:cNvGrpSpPr/>
-        <p:nvPr/>
-      </p:nvGrpSpPr>
-      <p:grpSpPr>
-        <a:xfrm>
-          <a:off x="0" y="0"/>
-          <a:ext cx="0" cy="0"/>
-          <a:chOff x="0" y="0"/>
-          <a:chExt cx="0" cy="0"/>
-        </a:xfrm>
-      </p:grpSpPr>
-      <p:sp>
-        <p:nvSpPr>
-          <p:cNvPr id="15362" name="Title 1"/>
-          <p:cNvSpPr>
-            <a:spLocks noGrp="1"/>
-          </p:cNvSpPr>
-          <p:nvPr>
-            <p:ph type="title"/>
-          </p:nvPr>
-        </p:nvSpPr>
-        <p:spPr/>
-        <p:txBody>
-          <a:bodyPr/>
-          <a:lstStyle/>
-          <a:p>
-            <a:r>
-              <a:rPr lang="en-NZ" dirty="0" err="1" smtClean="0"/>
-              <a:t>PeerWise</a:t>
-            </a:r>
-            <a:endParaRPr lang="en-NZ" dirty="0" smtClean="0"/>
-          </a:p>
-        </p:txBody>
-      </p:sp>
-      <p:sp>
-        <p:nvSpPr>
-          <p:cNvPr id="15363" name="Content Placeholder 2"/>
-          <p:cNvSpPr>
-            <a:spLocks noGrp="1"/>
-          </p:cNvSpPr>
-          <p:nvPr>
-            <p:ph sz="quarter" idx="13"/>
-          </p:nvPr>
-        </p:nvSpPr>
-        <p:spPr/>
-        <p:txBody>
-          <a:bodyPr>
-            <a:normAutofit fontScale="92500" lnSpcReduction="20000"/>
-          </a:bodyPr>
-          <a:lstStyle/>
-          <a:p>
-            <a:r>
-              <a:rPr lang="en-NZ" sz="3500" dirty="0" smtClean="0"/>
-              <a:t>What is it?</a:t>
-            </a:r>
-          </a:p>
-          <a:p>
-            <a:pPr lvl="1"/>
-            <a:r>
-              <a:rPr lang="en-NZ" sz="2400" dirty="0" smtClean="0"/>
-              <a:t>“Students use </a:t>
-            </a:r>
-            <a:r>
-              <a:rPr lang="en-NZ" sz="2400" dirty="0" err="1" smtClean="0"/>
-              <a:t>PeerWise</a:t>
-            </a:r>
-            <a:r>
-              <a:rPr lang="en-NZ" sz="2400" dirty="0" smtClean="0"/>
-              <a:t> to create and to explain their understanding of course related assessment questions, and to answer and discuss questions created by their peers”.</a:t>
-            </a:r>
-          </a:p>
-          <a:p>
-            <a:pPr lvl="1"/>
-            <a:r>
-              <a:rPr lang="en-NZ" sz="2400" dirty="0" smtClean="0">
-                <a:hlinkClick r:id="rId2"/>
-              </a:rPr>
-              <a:t>http://peerwise.cs.auckland.ac.nz/</a:t>
-            </a:r>
-            <a:endParaRPr lang="en-NZ" sz="2400" dirty="0" smtClean="0"/>
-          </a:p>
-          <a:p>
-            <a:r>
-              <a:rPr lang="en-NZ" dirty="0" smtClean="0"/>
-              <a:t>How do I contribute? </a:t>
-            </a:r>
-          </a:p>
-          <a:p>
-            <a:pPr lvl="1"/>
-            <a:r>
-              <a:rPr lang="en-NZ" sz="2400" dirty="0" smtClean="0"/>
-              <a:t>each student is to post </a:t>
-            </a:r>
-            <a:r>
-              <a:rPr lang="en-NZ" sz="2400" i="1" dirty="0" smtClean="0"/>
-              <a:t>at least </a:t>
-            </a:r>
-            <a:r>
-              <a:rPr lang="en-NZ" sz="2400" dirty="0" smtClean="0"/>
-              <a:t>1 question per week and answer existing questions, starting from this week </a:t>
-            </a:r>
-            <a:r>
-              <a:rPr lang="en-NZ" sz="2400" dirty="0" smtClean="0">
-                <a:sym typeface="Wingdings" pitchFamily="2" charset="2"/>
-              </a:rPr>
-              <a:t> </a:t>
-            </a:r>
-          </a:p>
-          <a:p>
-            <a:pPr lvl="1"/>
-            <a:r>
-              <a:rPr lang="en-NZ" sz="2400" dirty="0" smtClean="0">
-                <a:sym typeface="Wingdings" pitchFamily="2" charset="2"/>
-              </a:rPr>
-              <a:t>We monitor your contribution on a weekly basis</a:t>
-            </a:r>
-            <a:endParaRPr lang="en-NZ" sz="2400" dirty="0" smtClean="0"/>
-          </a:p>
-          <a:p>
-            <a:r>
-              <a:rPr lang="en-NZ" dirty="0" smtClean="0"/>
-              <a:t>Why do I need to contribute?</a:t>
-            </a:r>
-          </a:p>
-          <a:p>
-            <a:pPr lvl="1"/>
-            <a:r>
-              <a:rPr lang="en-NZ" sz="2400" dirty="0" smtClean="0"/>
-              <a:t>Ask, Share, Learn…</a:t>
-            </a:r>
-          </a:p>
-          <a:p>
-            <a:pPr lvl="1"/>
-            <a:r>
-              <a:rPr lang="en-NZ" sz="2400" dirty="0" smtClean="0"/>
-              <a:t>Some of “Your” questions will be used in the exam</a:t>
-            </a:r>
-          </a:p>
-          <a:p>
-            <a:pPr>
-              <a:buNone/>
-            </a:pPr>
-            <a:endParaRPr lang="en-NZ" dirty="0" smtClean="0"/>
-          </a:p>
-        </p:txBody>
-      </p:sp>
-      <p:pic>
-        <p:nvPicPr>
-          <p:cNvPr id="15364" name="Picture 3" descr="PW.JPG"/>
-          <p:cNvPicPr>
-            <a:picLocks noChangeAspect="1"/>
-          </p:cNvPicPr>
-          <p:nvPr/>
-        </p:nvPicPr>
-        <p:blipFill>
-          <a:blip r:embed="rId3" cstate="print"/>
-          <a:srcRect r="13332" b="34302"/>
-          <a:stretch>
-            <a:fillRect/>
-          </a:stretch>
-        </p:blipFill>
-        <p:spPr bwMode="auto">
-          <a:xfrm>
-            <a:off x="6643688" y="5767388"/>
-            <a:ext cx="2500312" cy="1090612"/>
-          </a:xfrm>
-          <a:prstGeom prst="rect">
-            <a:avLst/>
-          </a:prstGeom>
-          <a:noFill/>
-          <a:ln w="9525">
-            <a:noFill/>
-            <a:miter lim="800000"/>
-            <a:headEnd/>
-            <a:tailEnd/>
-          </a:ln>
-        </p:spPr>
-      </p:pic>
-    </p:spTree>
-  </p:cSld>
-  <p:clrMapOvr>
-    <a:masterClrMapping/>
-  </p:clrMapOvr>
-  <p:timing>
-    <p:tnLst>
-      <p:par>
-        <p:cTn id="1" dur="indefinite" restart="never" nodeType="tmRoot"/>
-      </p:par>
-    </p:tnLst>
-  </p:timing>
-</p:sld>
-</file>
-
-<file path=ppt/slides/slide13.xml><?xml version="1.0" encoding="utf-8"?>
-<p:sld xmlns:a="http://schemas.openxmlformats.org/drawingml/2006/main" xmlns:r="http://schemas.openxmlformats.org/officeDocument/2006/relationships" xmlns:p="http://schemas.openxmlformats.org/presentationml/2006/main">
-  <p:cSld>
-    <p:spTree>
-      <p:nvGrpSpPr>
-        <p:cNvPr id="1" name=""/>
-        <p:cNvGrpSpPr/>
-        <p:nvPr/>
-      </p:nvGrpSpPr>
-      <p:grpSpPr>
-        <a:xfrm>
-          <a:off x="0" y="0"/>
-          <a:ext cx="0" cy="0"/>
-          <a:chOff x="0" y="0"/>
-          <a:chExt cx="0" cy="0"/>
-        </a:xfrm>
-      </p:grpSpPr>
-      <p:sp>
-        <p:nvSpPr>
-          <p:cNvPr id="2" name="Title 1"/>
-          <p:cNvSpPr>
-            <a:spLocks noGrp="1"/>
-          </p:cNvSpPr>
-          <p:nvPr>
-            <p:ph type="title"/>
-          </p:nvPr>
-        </p:nvSpPr>
-        <p:spPr/>
-        <p:txBody>
-          <a:bodyPr/>
-          <a:lstStyle/>
-          <a:p>
-            <a:r>
-              <a:rPr lang="en-NZ" dirty="0" err="1" smtClean="0"/>
-              <a:t>PeerWise</a:t>
-            </a:r>
-            <a:endParaRPr lang="en-NZ" dirty="0"/>
-          </a:p>
-        </p:txBody>
-      </p:sp>
-      <p:sp>
-        <p:nvSpPr>
-          <p:cNvPr id="3" name="Content Placeholder 2"/>
-          <p:cNvSpPr>
-            <a:spLocks noGrp="1"/>
-          </p:cNvSpPr>
-          <p:nvPr>
-            <p:ph sz="quarter" idx="13"/>
-          </p:nvPr>
-        </p:nvSpPr>
-        <p:spPr/>
-        <p:txBody>
-          <a:bodyPr>
-            <a:normAutofit fontScale="77500" lnSpcReduction="20000"/>
-          </a:bodyPr>
-          <a:lstStyle/>
-          <a:p>
-            <a:r>
-              <a:rPr lang="en-NZ" dirty="0" smtClean="0"/>
-              <a:t>If you have not used </a:t>
-            </a:r>
-            <a:r>
-              <a:rPr lang="en-NZ" dirty="0" err="1" smtClean="0"/>
-              <a:t>PeerWise</a:t>
-            </a:r>
-            <a:r>
-              <a:rPr lang="en-NZ" dirty="0" smtClean="0"/>
-              <a:t> before, you should choose a username and a password for your account. </a:t>
-            </a:r>
-            <a:r>
-              <a:rPr lang="en-NZ" dirty="0" smtClean="0">
-                <a:hlinkClick r:id="rId2"/>
-              </a:rPr>
-              <a:t>http://peerwise.cs.auckland.ac.nz/register/?unitec_nz </a:t>
-            </a:r>
-            <a:r>
-              <a:rPr lang="en-NZ" dirty="0" smtClean="0"/>
-              <a:t/>
-            </a:r>
-            <a:br>
-              <a:rPr lang="en-NZ" dirty="0" smtClean="0"/>
-            </a:br>
-            <a:r>
-              <a:rPr lang="en-NZ" dirty="0" smtClean="0"/>
-              <a:t/>
-            </a:r>
-            <a:br>
-              <a:rPr lang="en-NZ" dirty="0" smtClean="0"/>
-            </a:br>
-            <a:r>
-              <a:rPr lang="en-NZ" dirty="0" smtClean="0"/>
-              <a:t>To access our course, "User Interface Design (Semester 2, 2012)", you will need to enter two pieces of information: </a:t>
-            </a:r>
-            <a:br>
-              <a:rPr lang="en-NZ" dirty="0" smtClean="0"/>
-            </a:br>
-            <a:r>
-              <a:rPr lang="en-NZ" dirty="0" smtClean="0"/>
-              <a:t/>
-            </a:r>
-            <a:br>
-              <a:rPr lang="en-NZ" dirty="0" smtClean="0"/>
-            </a:br>
-            <a:r>
-              <a:rPr lang="en-NZ" dirty="0" smtClean="0"/>
-              <a:t>1) Course ID = </a:t>
-            </a:r>
-            <a:r>
-              <a:rPr lang="en-NZ" b="1" dirty="0" smtClean="0"/>
-              <a:t>6205</a:t>
-            </a:r>
-            <a:r>
-              <a:rPr lang="en-NZ" dirty="0" smtClean="0"/>
-              <a:t/>
-            </a:r>
-            <a:br>
-              <a:rPr lang="en-NZ" dirty="0" smtClean="0"/>
-            </a:br>
-            <a:r>
-              <a:rPr lang="en-NZ" dirty="0" smtClean="0"/>
-              <a:t>2) Identifier = </a:t>
-            </a:r>
-            <a:r>
-              <a:rPr lang="en-NZ" b="1" dirty="0" smtClean="0"/>
-              <a:t>Please enter your Unitec student ID number</a:t>
-            </a:r>
-            <a:br>
-              <a:rPr lang="en-NZ" b="1" dirty="0" smtClean="0"/>
-            </a:br>
-            <a:r>
-              <a:rPr lang="en-NZ" b="1" dirty="0" smtClean="0"/>
-              <a:t/>
-            </a:r>
-            <a:br>
-              <a:rPr lang="en-NZ" b="1" dirty="0" smtClean="0"/>
-            </a:br>
-            <a:r>
-              <a:rPr lang="en-NZ" dirty="0" smtClean="0"/>
-              <a:t>If you have used </a:t>
-            </a:r>
-            <a:r>
-              <a:rPr lang="en-NZ" dirty="0" err="1" smtClean="0"/>
-              <a:t>PeerWise</a:t>
-            </a:r>
-            <a:r>
-              <a:rPr lang="en-NZ" dirty="0" smtClean="0"/>
-              <a:t> before, simply log in and then select "Join course" from the Home menu: </a:t>
-            </a:r>
-            <a:r>
-              <a:rPr lang="en-NZ" dirty="0" smtClean="0">
-                <a:hlinkClick r:id="rId3"/>
-              </a:rPr>
-              <a:t>http://peerwise.cs.auckland.ac.nz/at/?unitec_nz </a:t>
-            </a:r>
-            <a:endParaRPr lang="en-NZ" dirty="0" smtClean="0"/>
-          </a:p>
-          <a:p>
-            <a:pPr marL="342900" lvl="1" indent="-342900">
-              <a:buFont typeface="Arial" pitchFamily="34" charset="0"/>
-              <a:buChar char="•"/>
-            </a:pPr>
-            <a:endParaRPr lang="en-NZ" sz="2400" dirty="0" smtClean="0"/>
-          </a:p>
-          <a:p>
-            <a:pPr marL="342900" lvl="1" indent="-342900">
-              <a:buFont typeface="Arial" pitchFamily="34" charset="0"/>
-              <a:buChar char="•"/>
-            </a:pPr>
-            <a:r>
-              <a:rPr lang="en-NZ" sz="3100" dirty="0" smtClean="0"/>
-              <a:t>Contact </a:t>
-            </a:r>
-            <a:r>
-              <a:rPr lang="en-NZ" sz="3100" dirty="0" smtClean="0"/>
-              <a:t>Me if </a:t>
-            </a:r>
-            <a:r>
-              <a:rPr lang="en-NZ" sz="3100" dirty="0" smtClean="0"/>
-              <a:t>you have any problems</a:t>
-            </a:r>
-          </a:p>
-          <a:p>
-            <a:endParaRPr lang="en-NZ" dirty="0"/>
-          </a:p>
-        </p:txBody>
-      </p:sp>
-      <p:sp>
-        <p:nvSpPr>
-          <p:cNvPr id="4" name="Slide Number Placeholder 3"/>
-          <p:cNvSpPr>
-            <a:spLocks noGrp="1"/>
-          </p:cNvSpPr>
-          <p:nvPr>
-            <p:ph type="sldNum" sz="quarter" idx="4294967295"/>
-          </p:nvPr>
-        </p:nvSpPr>
-        <p:spPr>
-          <a:xfrm>
-            <a:off x="8610600" y="6353175"/>
-            <a:ext cx="533400" cy="244475"/>
-          </a:xfrm>
-        </p:spPr>
-        <p:txBody>
-          <a:bodyPr>
-            <a:normAutofit fontScale="85000" lnSpcReduction="20000"/>
-          </a:bodyPr>
-          <a:lstStyle/>
-          <a:p>
-            <a:fld id="{B6F15528-21DE-4FAA-801E-634DDDAF4B2B}" type="slidenum">
-              <a:rPr lang="en-US" smtClean="0"/>
-              <a:pPr/>
-              <a:t>13</a:t>
-            </a:fld>
-            <a:endParaRPr lang="en-US" dirty="0"/>
-          </a:p>
-        </p:txBody>
-      </p:sp>
-      <p:pic>
-        <p:nvPicPr>
-          <p:cNvPr id="5" name="Picture 3" descr="PW.JPG"/>
-          <p:cNvPicPr>
-            <a:picLocks noChangeAspect="1"/>
-          </p:cNvPicPr>
-          <p:nvPr/>
-        </p:nvPicPr>
-        <p:blipFill>
-          <a:blip r:embed="rId4" cstate="print"/>
-          <a:srcRect r="13332" b="34302"/>
-          <a:stretch>
-            <a:fillRect/>
-          </a:stretch>
-        </p:blipFill>
-        <p:spPr bwMode="auto">
-          <a:xfrm>
-            <a:off x="6643688" y="5767388"/>
-            <a:ext cx="2500312" cy="1090612"/>
-          </a:xfrm>
-          <a:prstGeom prst="rect">
-            <a:avLst/>
-          </a:prstGeom>
-          <a:noFill/>
-          <a:ln w="9525">
-            <a:noFill/>
-            <a:miter lim="800000"/>
-            <a:headEnd/>
-            <a:tailEnd/>
-          </a:ln>
-        </p:spPr>
-      </p:pic>
     </p:spTree>
   </p:cSld>
   <p:clrMapOvr>
@@ -5496,7 +5018,6 @@
               <a:rPr lang="en-NZ" dirty="0" smtClean="0"/>
               <a:t>Associations</a:t>
             </a:r>
-            <a:endParaRPr lang="en-NZ" dirty="0" smtClean="0"/>
           </a:p>
           <a:p>
             <a:r>
@@ -5509,7 +5030,6 @@
               <a:rPr lang="en-NZ" dirty="0" smtClean="0"/>
               <a:t>Specifying Foreign Keys</a:t>
             </a:r>
-            <a:endParaRPr lang="en-NZ" dirty="0" smtClean="0"/>
           </a:p>
           <a:p>
             <a:r>
@@ -5522,14 +5042,12 @@
               <a:rPr lang="en-NZ" dirty="0" smtClean="0"/>
               <a:t>Proxies</a:t>
             </a:r>
-            <a:endParaRPr lang="en-NZ" dirty="0" smtClean="0"/>
           </a:p>
           <a:p>
             <a:r>
               <a:rPr lang="en-NZ" dirty="0" smtClean="0"/>
               <a:t>Summary</a:t>
             </a:r>
-            <a:endParaRPr lang="en-NZ" dirty="0" smtClean="0"/>
           </a:p>
           <a:p>
             <a:endParaRPr lang="en-NZ" dirty="0" smtClean="0"/>
@@ -6101,7 +5619,6 @@
               <a:rPr lang="en-NZ" sz="2900" dirty="0" smtClean="0"/>
               <a:t>Many-to-Many uses a mapping table</a:t>
             </a:r>
-            <a:endParaRPr lang="en-NZ" sz="2900" dirty="0" smtClean="0"/>
           </a:p>
           <a:p>
             <a:pPr marL="320040" lvl="1" indent="-320040">
@@ -6376,7 +5893,6 @@
               <a:rPr lang="en-NZ" sz="2800" dirty="0" smtClean="0"/>
               <a:t>Set the relationship type, fetch and cascade modes</a:t>
             </a:r>
-            <a:endParaRPr lang="en-NZ" sz="2800" dirty="0" smtClean="0"/>
           </a:p>
           <a:p>
             <a:pPr lvl="1"/>
@@ -6499,7 +6015,6 @@
               <a:rPr lang="en-NZ" dirty="0" smtClean="0"/>
               <a:t>ALL – cascade all operations</a:t>
             </a:r>
-            <a:endParaRPr lang="en-NZ" dirty="0" smtClean="0"/>
           </a:p>
           <a:p>
             <a:pPr lvl="1"/>
@@ -6507,7 +6022,6 @@
               <a:rPr lang="en-NZ" dirty="0" smtClean="0"/>
               <a:t>PERSIST – cascade persist operations</a:t>
             </a:r>
-            <a:endParaRPr lang="en-NZ" dirty="0" smtClean="0"/>
           </a:p>
           <a:p>
             <a:pPr lvl="1"/>
@@ -6515,7 +6029,6 @@
               <a:rPr lang="en-NZ" dirty="0" smtClean="0"/>
               <a:t>MERGE – cascade merge operations</a:t>
             </a:r>
-            <a:endParaRPr lang="en-NZ" dirty="0" smtClean="0"/>
           </a:p>
           <a:p>
             <a:pPr lvl="1"/>
@@ -6523,7 +6036,6 @@
               <a:rPr lang="en-NZ" dirty="0" smtClean="0"/>
               <a:t>REMOVE – cascade remove operations</a:t>
             </a:r>
-            <a:endParaRPr lang="en-NZ" dirty="0" smtClean="0"/>
           </a:p>
           <a:p>
             <a:pPr lvl="1"/>
@@ -6535,15 +6047,7 @@
           <a:p>
             <a:r>
               <a:rPr lang="en-NZ" dirty="0" smtClean="0"/>
-              <a:t>Eager fetch can use either an outer join (by default) or </a:t>
-            </a:r>
-            <a:r>
-              <a:rPr lang="en-NZ" dirty="0" smtClean="0"/>
-              <a:t>can </a:t>
-            </a:r>
-            <a:r>
-              <a:rPr lang="en-NZ" dirty="0" smtClean="0"/>
-              <a:t>use a sub-query.</a:t>
+              <a:t>Eager fetch can use either an outer join (by default) or can use a sub-query.</a:t>
             </a:r>
           </a:p>
           <a:p>
@@ -6667,7 +6171,6 @@
               <a:rPr lang="en-NZ" sz="3200" dirty="0" smtClean="0"/>
               <a:t> annotation</a:t>
             </a:r>
-            <a:endParaRPr lang="en-NZ" sz="3200" dirty="0" smtClean="0"/>
           </a:p>
           <a:p>
             <a:pPr marL="594360" lvl="2" indent="-320040">
@@ -6807,13 +6310,7 @@
               <a:rPr lang="en-NZ" dirty="0" smtClean="0">
                 <a:hlinkClick r:id="rId2"/>
               </a:rPr>
-              <a:t>http://</a:t>
-            </a:r>
-            <a:r>
-              <a:rPr lang="en-NZ" dirty="0" smtClean="0">
-                <a:hlinkClick r:id="rId2"/>
-              </a:rPr>
-              <a:t>docs.oracle.com/javaee/6/api/javax/persistence/JoinColumn.html</a:t>
+              <a:t>http://docs.oracle.com/javaee/6/api/javax/persistence/JoinColumn.html</a:t>
             </a:r>
             <a:endParaRPr lang="en-NZ" dirty="0" smtClean="0"/>
           </a:p>
@@ -6899,19 +6396,7 @@
           <a:p>
             <a:r>
               <a:rPr lang="en-NZ" dirty="0" smtClean="0"/>
-              <a:t>A proxy is a placeholder that triggers the loading of the real object when </a:t>
-            </a:r>
-            <a:r>
-              <a:rPr lang="en-NZ" dirty="0" smtClean="0"/>
-              <a:t>it’s accessed </a:t>
-            </a:r>
-            <a:r>
-              <a:rPr lang="en-NZ" dirty="0" smtClean="0"/>
-              <a:t>for the first </a:t>
-            </a:r>
-            <a:r>
-              <a:rPr lang="en-NZ" dirty="0" smtClean="0"/>
-              <a:t>time.</a:t>
+              <a:t>A proxy is a placeholder that triggers the loading of the real object when it’s accessed for the first time.</a:t>
             </a:r>
           </a:p>
           <a:p>
@@ -7158,16 +6643,7 @@
                 </a:solidFill>
                 <a:latin typeface="Consolas"/>
               </a:rPr>
-              <a:t> </a:t>
-            </a:r>
-            <a:r>
-              <a:rPr lang="en-NZ" sz="1600" dirty="0" smtClean="0">
-                <a:solidFill>
-                  <a:srgbClr val="000000"/>
-                </a:solidFill>
-                <a:latin typeface="Consolas"/>
-              </a:rPr>
-              <a:t>{</a:t>
+              <a:t> {</a:t>
             </a:r>
             <a:endParaRPr lang="en-NZ" sz="1600" dirty="0" smtClean="0">
               <a:latin typeface="Consolas"/>
@@ -7193,16 +6669,7 @@
                 </a:solidFill>
                 <a:latin typeface="Consolas"/>
               </a:rPr>
-              <a:t> </a:t>
-            </a:r>
-            <a:r>
-              <a:rPr lang="en-NZ" sz="1600" dirty="0" smtClean="0">
-                <a:solidFill>
-                  <a:srgbClr val="000000"/>
-                </a:solidFill>
-                <a:latin typeface="Consolas"/>
-              </a:rPr>
-              <a:t>Long </a:t>
+              <a:t> Long </a:t>
             </a:r>
             <a:r>
               <a:rPr lang="en-NZ" sz="1600" dirty="0" err="1" smtClean="0">
@@ -7374,7 +6841,16 @@
                 </a:solidFill>
                 <a:latin typeface="Consolas"/>
               </a:rPr>
-              <a:t> (fetch=</a:t>
+              <a:t> </a:t>
+            </a:r>
+            <a:r>
+              <a:rPr lang="en-NZ" sz="1600" dirty="0" smtClean="0">
+                <a:solidFill>
+                  <a:srgbClr val="000000"/>
+                </a:solidFill>
+                <a:latin typeface="Consolas"/>
+              </a:rPr>
+              <a:t>(</a:t>
             </a:r>
             <a:r>
               <a:rPr lang="en-NZ" sz="1600" dirty="0" err="1" smtClean="0">
@@ -7383,52 +6859,61 @@
                 </a:solidFill>
                 <a:latin typeface="Consolas"/>
               </a:rPr>
-              <a:t>FetchType.</a:t>
-            </a:r>
-            <a:r>
-              <a:rPr lang="en-NZ" sz="1600" i="1" dirty="0" err="1" smtClean="0">
-                <a:solidFill>
-                  <a:srgbClr val="0000C0"/>
-                </a:solidFill>
-                <a:latin typeface="Consolas"/>
-              </a:rPr>
-              <a:t>EAGER</a:t>
-            </a:r>
-            <a:r>
-              <a:rPr lang="en-NZ" sz="1600" i="1" dirty="0" err="1" smtClean="0">
+              <a:t>mappedBy</a:t>
+            </a:r>
+            <a:r>
+              <a:rPr lang="en-NZ" sz="1600" dirty="0" smtClean="0">
                 <a:solidFill>
                   <a:srgbClr val="000000"/>
                 </a:solidFill>
                 <a:latin typeface="Consolas"/>
               </a:rPr>
-              <a:t>,cascade</a:t>
-            </a:r>
-            <a:r>
-              <a:rPr lang="en-NZ" sz="1600" i="1" dirty="0" smtClean="0">
+              <a:t>="</a:t>
+            </a:r>
+            <a:r>
+              <a:rPr lang="en-NZ" sz="1600" dirty="0" err="1" smtClean="0">
                 <a:solidFill>
                   <a:srgbClr val="000000"/>
                 </a:solidFill>
                 <a:latin typeface="Consolas"/>
               </a:rPr>
+              <a:t>book",fetch</a:t>
+            </a:r>
+            <a:r>
+              <a:rPr lang="en-NZ" sz="1600" dirty="0" smtClean="0">
+                <a:solidFill>
+                  <a:srgbClr val="000000"/>
+                </a:solidFill>
+                <a:latin typeface="Consolas"/>
+              </a:rPr>
               <a:t>=</a:t>
             </a:r>
             <a:r>
-              <a:rPr lang="en-NZ" sz="1600" i="1" dirty="0" err="1" smtClean="0">
+              <a:rPr lang="en-NZ" sz="1600" dirty="0" err="1" smtClean="0">
                 <a:solidFill>
                   <a:srgbClr val="000000"/>
                 </a:solidFill>
                 <a:latin typeface="Consolas"/>
               </a:rPr>
-              <a:t>CascadeType.</a:t>
-            </a:r>
-            <a:r>
-              <a:rPr lang="en-NZ" sz="1600" i="1" dirty="0" err="1" smtClean="0">
-                <a:solidFill>
-                  <a:srgbClr val="0000C0"/>
-                </a:solidFill>
-                <a:latin typeface="Consolas"/>
-              </a:rPr>
-              <a:t>ALL</a:t>
+              <a:t>FetchType.EAGER,cascade</a:t>
+            </a:r>
+            <a:r>
+              <a:rPr lang="en-NZ" sz="1600" dirty="0" smtClean="0">
+                <a:solidFill>
+                  <a:srgbClr val="000000"/>
+                </a:solidFill>
+                <a:latin typeface="Consolas"/>
+              </a:rPr>
+              <a:t>=</a:t>
+            </a:r>
+            <a:r>
+              <a:rPr lang="en-NZ" sz="1600" dirty="0" err="1" smtClean="0">
+                <a:solidFill>
+                  <a:srgbClr val="000000"/>
+                </a:solidFill>
+                <a:latin typeface="Consolas"/>
+              </a:rPr>
+              <a:t>CascadeType.ALL</a:t>
             </a:r>
             <a:r>
               <a:rPr lang="en-NZ" sz="1600" i="1" dirty="0" smtClean="0">

</xml_diff>